<commit_message>
changes to final presentation and poster
</commit_message>
<xml_diff>
--- a/ConvectionNNPoster_V2.pptx
+++ b/ConvectionNNPoster_V2.pptx
@@ -4806,6 +4806,63 @@
       </p:grpSpPr>
       <p:sp>
         <p:nvSpPr>
+          <p:cNvPr id="52" name="Content Placeholder 5"/>
+          <p:cNvSpPr>
+            <a:spLocks noGrp="1"/>
+          </p:cNvSpPr>
+          <p:nvPr>
+            <p:ph sz="quarter" idx="33"/>
+          </p:nvPr>
+        </p:nvSpPr>
+        <p:spPr>
+          <a:xfrm>
+            <a:off x="30791620" y="6917029"/>
+            <a:ext cx="12801600" cy="13576584"/>
+          </a:xfrm>
+          <a:solidFill>
+            <a:schemeClr val="tx2">
+              <a:lumMod val="10000"/>
+              <a:lumOff val="90000"/>
+            </a:schemeClr>
+          </a:solidFill>
+        </p:spPr>
+        <p:txBody>
+          <a:bodyPr>
+            <a:normAutofit/>
+          </a:bodyPr>
+          <a:lstStyle/>
+          <a:p>
+            <a:pPr marL="0" marR="0" lvl="0" indent="0" defTabSz="914400" eaLnBrk="1" fontAlgn="auto" latinLnBrk="0" hangingPunct="1">
+              <a:lnSpc>
+                <a:spcPct val="100000"/>
+              </a:lnSpc>
+              <a:spcBef>
+                <a:spcPts val="0"/>
+              </a:spcBef>
+              <a:spcAft>
+                <a:spcPts val="0"/>
+              </a:spcAft>
+              <a:buClrTx/>
+              <a:buSzTx/>
+              <a:buFontTx/>
+              <a:buNone/>
+              <a:tabLst/>
+              <a:defRPr/>
+            </a:pPr>
+            <a:r>
+              <a:rPr lang="en-US" dirty="0" smtClean="0"/>
+              <a:t>Seed text generated from first 40 characters of oatmeal </a:t>
+            </a:r>
+            <a:r>
+              <a:rPr lang="en-US" dirty="0" smtClean="0"/>
+              <a:t>cookie recipe</a:t>
+            </a:r>
+            <a:endParaRPr lang="en-US" dirty="0"/>
+          </a:p>
+        </p:txBody>
+      </p:sp>
+      <p:sp>
+        <p:nvSpPr>
           <p:cNvPr id="50" name="TextBox 49"/>
           <p:cNvSpPr txBox="1"/>
           <p:nvPr/>
@@ -4828,13 +4885,8 @@
           <a:p>
             <a:r>
               <a:rPr lang="en-US" sz="3200" b="1" dirty="0" smtClean="0"/>
-              <a:t>Current </a:t>
-            </a:r>
-            <a:r>
-              <a:rPr lang="en-US" sz="3200" b="1" dirty="0" smtClean="0"/>
-              <a:t>Approach</a:t>
-            </a:r>
-            <a:endParaRPr lang="en-US" sz="3200" b="1" dirty="0" smtClean="0"/>
+              <a:t>Current Approach</a:t>
+            </a:r>
           </a:p>
           <a:p>
             <a:pPr marL="457200" indent="-457200">
@@ -4843,19 +4895,7 @@
             </a:pPr>
             <a:r>
               <a:rPr lang="en-US" sz="3200" u="sng" dirty="0" smtClean="0"/>
-              <a:t>Recurrent Neural </a:t>
-            </a:r>
-            <a:r>
-              <a:rPr lang="en-US" sz="3200" u="sng" dirty="0" smtClean="0"/>
-              <a:t>Networks </a:t>
-            </a:r>
-            <a:r>
-              <a:rPr lang="en-US" sz="3200" u="sng" dirty="0" smtClean="0"/>
-              <a:t>(</a:t>
-            </a:r>
-            <a:r>
-              <a:rPr lang="en-US" sz="3200" u="sng" dirty="0" smtClean="0"/>
-              <a:t>RNNs):</a:t>
+              <a:t>Recurrent Neural Networks (RNNs):</a:t>
             </a:r>
             <a:r>
               <a:rPr lang="en-US" sz="3200" dirty="0" smtClean="0"/>
@@ -4914,11 +4954,7 @@
           <a:p>
             <a:r>
               <a:rPr lang="en-US" sz="2400" dirty="0" smtClean="0"/>
-              <a:t>                   </a:t>
-            </a:r>
-            <a:r>
-              <a:rPr lang="en-US" sz="2400" dirty="0" smtClean="0"/>
-              <a:t>Figure 1 Illustration of RNN                                                  Figure 2 LSTM vs GRU</a:t>
+              <a:t>                   Figure 1 Illustration of RNN                                                  Figure 2 LSTM vs GRU</a:t>
             </a:r>
           </a:p>
           <a:p>
@@ -4935,11 +4971,7 @@
             </a:pPr>
             <a:r>
               <a:rPr lang="en-US" sz="3200" dirty="0" smtClean="0"/>
-              <a:t>Long short-term memory (LSTM) improves upon RNNs using memory cells that remember long-term </a:t>
-            </a:r>
-            <a:r>
-              <a:rPr lang="en-US" sz="3200" dirty="0" smtClean="0"/>
-              <a:t>values</a:t>
+              <a:t>Long short-term memory (LSTM) improves upon RNNs using memory cells that remember long-term values</a:t>
             </a:r>
             <a:br>
               <a:rPr lang="en-US" sz="3200" dirty="0" smtClean="0"/>
@@ -4953,15 +4985,7 @@
             </a:pPr>
             <a:r>
               <a:rPr lang="en-US" sz="3200" dirty="0" smtClean="0"/>
-              <a:t>Gated recurrent units’ (</a:t>
-            </a:r>
-            <a:r>
-              <a:rPr lang="en-US" sz="3200" dirty="0" smtClean="0"/>
-              <a:t>GRUs) are similar to LSTMs, but lack </a:t>
-            </a:r>
-            <a:r>
-              <a:rPr lang="en-US" sz="3200" dirty="0" smtClean="0"/>
-              <a:t>an output gate</a:t>
+              <a:t>Gated recurrent units’ (GRUs) are similar to LSTMs, but lack an output gate</a:t>
             </a:r>
           </a:p>
         </p:txBody>
@@ -5246,11 +5270,7 @@
             </a:r>
             <a:r>
               <a:rPr lang="en-US" sz="3200" dirty="0" smtClean="0"/>
-              <a:t>experiment </a:t>
-            </a:r>
-            <a:r>
-              <a:rPr lang="en-US" sz="3200" dirty="0" smtClean="0"/>
-              <a:t>with</a:t>
+              <a:t>experiment with</a:t>
             </a:r>
             <a:br>
               <a:rPr lang="en-US" sz="3200" dirty="0" smtClean="0"/>
@@ -5271,13 +5291,8 @@
             </a:pPr>
             <a:r>
               <a:rPr lang="en-US" sz="3200" dirty="0" smtClean="0"/>
-              <a:t>Current machine learning models are effective at copying and regurgitating </a:t>
-            </a:r>
-            <a:r>
-              <a:rPr lang="en-US" sz="3200" dirty="0" smtClean="0"/>
-              <a:t>inputs</a:t>
-            </a:r>
-            <a:endParaRPr lang="en-US" sz="3200" dirty="0" smtClean="0"/>
+              <a:t>Current machine learning models are effective at copying and regurgitating inputs</a:t>
+            </a:r>
           </a:p>
           <a:p>
             <a:pPr marL="457200" indent="-457200">
@@ -5326,7 +5341,6 @@
               <a:rPr lang="en-US" sz="3200" dirty="0" smtClean="0"/>
               <a:t>Models have been trained on a very general set of recipes including multiple types of food </a:t>
             </a:r>
-            <a:endParaRPr lang="en-US" sz="3200" dirty="0" smtClean="0"/>
           </a:p>
           <a:p>
             <a:pPr marL="457200" indent="-457200">
@@ -5336,17 +5350,8 @@
             </a:pPr>
             <a:r>
               <a:rPr lang="en-US" sz="3200" dirty="0" smtClean="0"/>
-              <a:t>Some </a:t>
-            </a:r>
-            <a:r>
-              <a:rPr lang="en-US" sz="3200" dirty="0" smtClean="0"/>
-              <a:t>common ingredient like salt appears in recipes as varied as cakes, burgers and pizzas, confusing the </a:t>
-            </a:r>
-            <a:r>
-              <a:rPr lang="en-US" sz="3200" dirty="0" smtClean="0"/>
-              <a:t>model </a:t>
-            </a:r>
-            <a:endParaRPr lang="en-US" sz="3200" dirty="0" smtClean="0"/>
+              <a:t>Some common ingredient like salt appears in recipes as varied as cakes, burgers and pizzas, confusing the model </a:t>
+            </a:r>
           </a:p>
           <a:p>
             <a:pPr marL="457200" indent="-457200">
@@ -5356,17 +5361,8 @@
             </a:pPr>
             <a:r>
               <a:rPr lang="en-US" sz="3200" dirty="0" smtClean="0"/>
-              <a:t>Training with </a:t>
-            </a:r>
-            <a:r>
-              <a:rPr lang="en-US" sz="3200" dirty="0" smtClean="0"/>
-              <a:t>both directions and ingredients adds to the complexity and the models focused on learning format rather than </a:t>
-            </a:r>
-            <a:r>
-              <a:rPr lang="en-US" sz="3200" dirty="0" smtClean="0"/>
-              <a:t>content </a:t>
-            </a:r>
-            <a:endParaRPr lang="en-US" sz="3200" dirty="0" smtClean="0"/>
+              <a:t>Training with both directions and ingredients adds to the complexity and the models focused on learning format rather than content </a:t>
+            </a:r>
           </a:p>
         </p:txBody>
       </p:sp>
@@ -5412,7 +5408,7 @@
         </p:nvSpPr>
         <p:spPr>
           <a:xfrm>
-            <a:off x="30749964" y="19767596"/>
+            <a:off x="30749964" y="20845279"/>
             <a:ext cx="12801600" cy="1219200"/>
           </a:xfrm>
           <a:solidFill>
@@ -5442,8 +5438,8 @@
         </p:nvSpPr>
         <p:spPr>
           <a:xfrm>
-            <a:off x="30749964" y="21212348"/>
-            <a:ext cx="12801600" cy="6646372"/>
+            <a:off x="30749964" y="22290031"/>
+            <a:ext cx="12801600" cy="5528181"/>
           </a:xfrm>
           <a:solidFill>
             <a:srgbClr val="E8E8E8"/>
@@ -5451,7 +5447,7 @@
         </p:spPr>
         <p:txBody>
           <a:bodyPr>
-            <a:normAutofit/>
+            <a:normAutofit lnSpcReduction="10000"/>
           </a:bodyPr>
           <a:lstStyle/>
           <a:p>
@@ -5481,9 +5477,21 @@
             </a:r>
             <a:r>
               <a:rPr lang="en-US" dirty="0" smtClean="0"/>
-              <a:t> capable of producing reasonable recipes</a:t>
-            </a:r>
-            <a:endParaRPr lang="en-US" dirty="0" smtClean="0"/>
+              <a:t> capable of producing reasonable </a:t>
+            </a:r>
+            <a:r>
+              <a:rPr lang="en-US" dirty="0" smtClean="0"/>
+              <a:t>recipes</a:t>
+            </a:r>
+          </a:p>
+          <a:p>
+            <a:pPr lvl="1">
+              <a:buClrTx/>
+            </a:pPr>
+            <a:r>
+              <a:rPr lang="en-US" dirty="0"/>
+              <a:t>Difficult to determine the differences in model performance from hyper-parameter tuning because the output evaluation is subjective</a:t>
+            </a:r>
           </a:p>
           <a:p>
             <a:pPr>
@@ -5508,16 +5516,12 @@
             </a:pPr>
             <a:r>
               <a:rPr lang="en-US" dirty="0" smtClean="0"/>
-              <a:t>Dictionary limited to those words/recipes available via the </a:t>
+              <a:t>Dictionary limited to those words/recipes available via </a:t>
             </a:r>
             <a:r>
               <a:rPr lang="en-US" dirty="0" err="1" smtClean="0"/>
               <a:t>Yummly</a:t>
             </a:r>
-            <a:r>
-              <a:rPr lang="en-US" dirty="0" smtClean="0"/>
-              <a:t> API</a:t>
-            </a:r>
             <a:endParaRPr lang="en-US" dirty="0"/>
           </a:p>
           <a:p>
@@ -5539,12 +5543,9 @@
             </a:pPr>
             <a:r>
               <a:rPr lang="en-US" dirty="0" smtClean="0"/>
-              <a:t>Generalize to include other types of food (e.g., muffins, </a:t>
-            </a:r>
-            <a:r>
-              <a:rPr lang="en-US" dirty="0" smtClean="0"/>
-              <a:t>cakes) and see if generated recipes can be classified</a:t>
-            </a:r>
+              <a:t>Use prepended titles as part of training observations to give models the ability to generate recipes using created titles</a:t>
+            </a:r>
+            <a:endParaRPr lang="en-US" dirty="0" smtClean="0"/>
           </a:p>
           <a:p>
             <a:pPr lvl="1">
@@ -5552,31 +5553,9 @@
             </a:pPr>
             <a:r>
               <a:rPr lang="en-US" dirty="0" smtClean="0"/>
-              <a:t>Train model to classify recipes based on ingredients</a:t>
-            </a:r>
-          </a:p>
-          <a:p>
-            <a:pPr lvl="1">
-              <a:buClrTx/>
-            </a:pPr>
-            <a:r>
-              <a:rPr lang="en-US" dirty="0" smtClean="0"/>
-              <a:t>Include </a:t>
-            </a:r>
-            <a:r>
-              <a:rPr lang="en-US" dirty="0" smtClean="0"/>
-              <a:t>directions to give full recipes</a:t>
-            </a:r>
-          </a:p>
-          <a:p>
-            <a:pPr lvl="1">
-              <a:buClrTx/>
-            </a:pPr>
-            <a:r>
-              <a:rPr lang="en-US" dirty="0" smtClean="0"/>
-              <a:t>Convert all fractions to decimals (e.g., ¾ to 0.75)</a:t>
-            </a:r>
-            <a:endParaRPr lang="en-US" dirty="0"/>
+              <a:t>Generalize to include other recipe types, then generate hybrid recipes</a:t>
+            </a:r>
+            <a:endParaRPr lang="en-US" dirty="0" smtClean="0"/>
           </a:p>
         </p:txBody>
       </p:sp>
@@ -5757,7 +5736,15 @@
             </a:r>
             <a:r>
               <a:rPr lang="en-US" sz="2000" dirty="0" smtClean="0"/>
-              <a:t>, James Martens, Geoffrey Hinton</a:t>
+              <a:t>, James Martens, </a:t>
+            </a:r>
+            <a:r>
+              <a:rPr lang="en-US" sz="2000" smtClean="0"/>
+              <a:t>Geoffrey </a:t>
+            </a:r>
+            <a:r>
+              <a:rPr lang="en-US" sz="2000" smtClean="0"/>
+              <a:t>Hinton)</a:t>
             </a:r>
             <a:endParaRPr lang="en-US" sz="2000" dirty="0"/>
           </a:p>
@@ -5802,14 +5789,14 @@
           </a:ln>
           <a:extLst>
             <a:ext uri="{909E8E84-426E-40dd-AFC4-6F175D3DCCD1}">
-              <a14:hiddenFill xmlns:a14="http://schemas.microsoft.com/office/drawing/2010/main" xmlns="">
+              <a14:hiddenFill xmlns="" xmlns:a14="http://schemas.microsoft.com/office/drawing/2010/main">
                 <a:solidFill>
                   <a:srgbClr val="FFFFFF"/>
                 </a:solidFill>
               </a14:hiddenFill>
             </a:ext>
             <a:ext uri="{91240B29-F687-4f45-9708-019B960494DF}">
-              <a14:hiddenLine xmlns:a14="http://schemas.microsoft.com/office/drawing/2010/main" xmlns="" w="9525">
+              <a14:hiddenLine xmlns="" xmlns:a14="http://schemas.microsoft.com/office/drawing/2010/main" w="9525">
                 <a:solidFill>
                   <a:srgbClr val="000000"/>
                 </a:solidFill>
@@ -6023,10 +6010,6 @@
               <a:rPr lang="en-US" sz="2200" dirty="0"/>
               <a:t>Prepended the title of the recipe to the beginning of the recipe </a:t>
             </a:r>
-            <a:r>
-              <a:rPr lang="en-US" sz="2200" dirty="0"/>
-              <a:t/>
-            </a:r>
             <a:br>
               <a:rPr lang="en-US" sz="2200" dirty="0"/>
             </a:br>
@@ -6363,7 +6346,6 @@
               <a:rPr lang="en-US" sz="2200" dirty="0" smtClean="0"/>
               <a:t>phrase-level</a:t>
             </a:r>
-            <a:endParaRPr lang="en-US" sz="2200" dirty="0" smtClean="0"/>
           </a:p>
           <a:p>
             <a:pPr marL="342900" indent="-342900">
@@ -6400,19 +6382,7 @@
             </a:pPr>
             <a:r>
               <a:rPr lang="en-US" sz="2200" dirty="0" smtClean="0"/>
-              <a:t>Word- </a:t>
-            </a:r>
-            <a:r>
-              <a:rPr lang="en-US" sz="2200" dirty="0" smtClean="0"/>
-              <a:t>and </a:t>
-            </a:r>
-            <a:r>
-              <a:rPr lang="en-US" sz="2200" dirty="0" smtClean="0"/>
-              <a:t>phrase-level: 50 </a:t>
-            </a:r>
-            <a:r>
-              <a:rPr lang="en-US" sz="2200" dirty="0" smtClean="0"/>
-              <a:t/>
+              <a:t>Word- and phrase-level: 50 </a:t>
             </a:r>
             <a:br>
               <a:rPr lang="en-US" sz="2200" dirty="0" smtClean="0"/>
@@ -6698,17 +6668,8 @@
             </a:pPr>
             <a:r>
               <a:rPr lang="en-US" sz="2400" dirty="0" smtClean="0"/>
-              <a:t>Evaluate </a:t>
-            </a:r>
-            <a:r>
-              <a:rPr lang="en-US" sz="2400" dirty="0" smtClean="0"/>
-              <a:t>model success by looking </a:t>
-            </a:r>
-            <a:r>
-              <a:rPr lang="en-US" sz="2400" dirty="0" smtClean="0"/>
-              <a:t>at generated recipes</a:t>
-            </a:r>
-            <a:endParaRPr lang="en-US" sz="2400" dirty="0" smtClean="0"/>
+              <a:t>Evaluate model success by looking at generated recipes</a:t>
+            </a:r>
           </a:p>
         </p:txBody>
       </p:sp>
@@ -6907,11 +6868,7 @@
             </a:r>
             <a:r>
               <a:rPr lang="en-US" dirty="0" smtClean="0"/>
-              <a:t>lists </a:t>
-            </a:r>
-            <a:r>
-              <a:rPr lang="en-US" dirty="0" smtClean="0"/>
-              <a:t>from </a:t>
+              <a:t>lists from </a:t>
             </a:r>
             <a:r>
               <a:rPr lang="en-US" dirty="0" err="1" smtClean="0"/>
@@ -6929,7 +6886,6 @@
               <a:rPr lang="en-US" dirty="0" smtClean="0"/>
               <a:t>’</a:t>
             </a:r>
-            <a:endParaRPr lang="en-US" dirty="0" smtClean="0"/>
           </a:p>
           <a:p>
             <a:pPr>
@@ -6959,11 +6915,7 @@
             </a:r>
             <a:r>
               <a:rPr lang="en-US" dirty="0" smtClean="0"/>
-              <a:t>from </a:t>
-            </a:r>
-            <a:r>
-              <a:rPr lang="en-US" dirty="0" smtClean="0"/>
-              <a:t>corpus</a:t>
+              <a:t>from corpus</a:t>
             </a:r>
             <a:endParaRPr lang="en-US" dirty="0"/>
           </a:p>
@@ -6973,11 +6925,7 @@
             </a:pPr>
             <a:r>
               <a:rPr lang="en-US" dirty="0" smtClean="0"/>
-              <a:t>Inspected </a:t>
-            </a:r>
-            <a:r>
-              <a:rPr lang="en-US" dirty="0" smtClean="0"/>
-              <a:t>the final dictionary and removed any words that were instructions or were unrelated to cookies</a:t>
+              <a:t>Inspected the final dictionary and removed any words that were instructions or were unrelated to cookies</a:t>
             </a:r>
           </a:p>
           <a:p>
@@ -7606,19 +7554,7 @@
             </a:pPr>
             <a:r>
               <a:rPr lang="en-US" sz="2200" dirty="0" smtClean="0"/>
-              <a:t>Compared </a:t>
-            </a:r>
-            <a:r>
-              <a:rPr lang="en-US" sz="2200" dirty="0" smtClean="0"/>
-              <a:t>GRU </a:t>
-            </a:r>
-            <a:r>
-              <a:rPr lang="en-US" sz="2200" dirty="0" smtClean="0"/>
-              <a:t>and LSTM </a:t>
-            </a:r>
-            <a:r>
-              <a:rPr lang="en-US" sz="2200" dirty="0" smtClean="0"/>
-              <a:t>performance</a:t>
+              <a:t>Compared GRU and LSTM performance</a:t>
             </a:r>
             <a:br>
               <a:rPr lang="en-US" sz="2200" dirty="0" smtClean="0"/>
@@ -7643,10 +7579,6 @@
               <a:rPr lang="en-US" sz="2200" dirty="0" smtClean="0"/>
               <a:t>Compared CNN and RNN performance</a:t>
             </a:r>
-            <a:r>
-              <a:rPr lang="en-US" sz="2200" dirty="0" smtClean="0"/>
-              <a:t/>
-            </a:r>
             <a:br>
               <a:rPr lang="en-US" sz="2200" dirty="0" smtClean="0"/>
             </a:br>
@@ -7691,19 +7623,7 @@
             </a:pPr>
             <a:r>
               <a:rPr lang="en-US" sz="2200" dirty="0" smtClean="0"/>
-              <a:t>Adjusted the number of </a:t>
-            </a:r>
-            <a:r>
-              <a:rPr lang="en-US" sz="2200" dirty="0" smtClean="0"/>
-              <a:t>neurons </a:t>
-            </a:r>
-            <a:r>
-              <a:rPr lang="en-US" sz="2200" dirty="0" smtClean="0"/>
-              <a:t>in the </a:t>
-            </a:r>
-            <a:r>
-              <a:rPr lang="en-US" sz="2200" dirty="0" smtClean="0"/>
-              <a:t>hidden layers(128, 256, 512)</a:t>
+              <a:t>Adjusted the number of neurons in the hidden layers(128, 256, 512)</a:t>
             </a:r>
             <a:endParaRPr lang="en-US" sz="2000" dirty="0" smtClean="0"/>
           </a:p>
@@ -7861,7 +7781,6 @@
               <a:rPr lang="en-US" sz="2400" b="1" dirty="0" smtClean="0"/>
               <a:t>Generate Recipes</a:t>
             </a:r>
-            <a:endParaRPr lang="en-US" sz="2400" b="1" dirty="0" smtClean="0"/>
           </a:p>
           <a:p>
             <a:pPr marL="342900" lvl="0" indent="-342900" defTabSz="1022350">
@@ -8283,15 +8202,7 @@
           <a:p>
             <a:r>
               <a:rPr lang="en-US" sz="2400" dirty="0" smtClean="0"/>
-              <a:t>Figure </a:t>
-            </a:r>
-            <a:r>
-              <a:rPr lang="en-US" sz="2400" dirty="0" smtClean="0"/>
-              <a:t>3: </a:t>
-            </a:r>
-            <a:r>
-              <a:rPr lang="en-US" sz="2400" dirty="0" smtClean="0"/>
-              <a:t>The </a:t>
+              <a:t>Figure 3: The </a:t>
             </a:r>
             <a:r>
               <a:rPr lang="en-US" sz="2400" dirty="0"/>
@@ -8329,13 +8240,8 @@
           <a:p>
             <a:r>
               <a:rPr lang="en-US" sz="3200" b="1" dirty="0" smtClean="0"/>
-              <a:t>Alternative </a:t>
-            </a:r>
-            <a:r>
-              <a:rPr lang="en-US" sz="3200" b="1" dirty="0" smtClean="0"/>
-              <a:t>Approaches</a:t>
-            </a:r>
-            <a:endParaRPr lang="en-US" sz="3200" b="1" dirty="0" smtClean="0"/>
+              <a:t>Alternative Approaches</a:t>
+            </a:r>
           </a:p>
           <a:p>
             <a:pPr marL="457200" indent="-457200">
@@ -8364,11 +8270,7 @@
             </a:r>
             <a:r>
               <a:rPr lang="en-US" sz="3200" dirty="0" smtClean="0"/>
-              <a:t>output, so the output layer can get information from both past </a:t>
-            </a:r>
-            <a:r>
-              <a:rPr lang="en-US" sz="3200" dirty="0" smtClean="0"/>
-              <a:t>and future states</a:t>
+              <a:t>output, so the output layer can get information from both past and future states</a:t>
             </a:r>
           </a:p>
           <a:p>
@@ -8533,7 +8435,7 @@
             <p:ph sz="quarter" idx="32"/>
           </p:nvPr>
         </p:nvPicPr>
-        <p:blipFill>
+        <p:blipFill rotWithShape="1">
           <a:blip r:embed="rId9">
             <a:extLst>
               <a:ext uri="{28A0092B-C50C-407E-A947-70E740481C1C}">
@@ -8541,14 +8443,13 @@
               </a:ext>
             </a:extLst>
           </a:blip>
-          <a:stretch>
-            <a:fillRect/>
-          </a:stretch>
+          <a:srcRect t="5342" r="6299"/>
+          <a:stretch/>
         </p:blipFill>
         <p:spPr>
           <a:xfrm>
-            <a:off x="31382567" y="8068328"/>
-            <a:ext cx="6024417" cy="4141787"/>
+            <a:off x="31382567" y="8289587"/>
+            <a:ext cx="5644937" cy="3920528"/>
           </a:xfrm>
         </p:spPr>
       </p:pic>
@@ -8562,7 +8463,7 @@
             <p:ph sz="quarter" idx="32"/>
           </p:nvPr>
         </p:nvPicPr>
-        <p:blipFill>
+        <p:blipFill rotWithShape="1">
           <a:blip r:embed="rId10">
             <a:extLst>
               <a:ext uri="{28A0092B-C50C-407E-A947-70E740481C1C}">
@@ -8570,14 +8471,13 @@
               </a:ext>
             </a:extLst>
           </a:blip>
-          <a:stretch>
-            <a:fillRect/>
-          </a:stretch>
+          <a:srcRect t="4784" r="5955"/>
+          <a:stretch/>
         </p:blipFill>
         <p:spPr>
           <a:xfrm>
-            <a:off x="37406984" y="8091346"/>
-            <a:ext cx="6026727" cy="4143375"/>
+            <a:off x="37406984" y="8289587"/>
+            <a:ext cx="5667787" cy="3945134"/>
           </a:xfrm>
         </p:spPr>
       </p:pic>
@@ -8591,7 +8491,7 @@
             <p:ph sz="quarter" idx="32"/>
           </p:nvPr>
         </p:nvPicPr>
-        <p:blipFill>
+        <p:blipFill rotWithShape="1">
           <a:blip r:embed="rId11">
             <a:extLst>
               <a:ext uri="{28A0092B-C50C-407E-A947-70E740481C1C}">
@@ -8599,64 +8499,16 @@
               </a:ext>
             </a:extLst>
           </a:blip>
-          <a:stretch>
-            <a:fillRect/>
-          </a:stretch>
+          <a:srcRect t="5017" r="5471"/>
+          <a:stretch/>
         </p:blipFill>
         <p:spPr>
           <a:xfrm>
-            <a:off x="31332652" y="13107141"/>
-            <a:ext cx="6024417" cy="4141786"/>
+            <a:off x="31332653" y="13314947"/>
+            <a:ext cx="5694852" cy="3933980"/>
           </a:xfrm>
         </p:spPr>
       </p:pic>
-      <p:sp>
-        <p:nvSpPr>
-          <p:cNvPr id="52" name="Content Placeholder 5"/>
-          <p:cNvSpPr>
-            <a:spLocks noGrp="1"/>
-          </p:cNvSpPr>
-          <p:nvPr>
-            <p:ph sz="quarter" idx="33"/>
-          </p:nvPr>
-        </p:nvSpPr>
-        <p:spPr>
-          <a:xfrm>
-            <a:off x="30791620" y="6917029"/>
-            <a:ext cx="12801600" cy="749582"/>
-          </a:xfrm>
-        </p:spPr>
-        <p:txBody>
-          <a:bodyPr>
-            <a:normAutofit fontScale="85000" lnSpcReduction="10000"/>
-          </a:bodyPr>
-          <a:lstStyle/>
-          <a:p>
-            <a:pPr marL="0" marR="0" lvl="0" indent="0" defTabSz="914400" eaLnBrk="1" fontAlgn="auto" latinLnBrk="0" hangingPunct="1">
-              <a:lnSpc>
-                <a:spcPct val="100000"/>
-              </a:lnSpc>
-              <a:spcBef>
-                <a:spcPts val="0"/>
-              </a:spcBef>
-              <a:spcAft>
-                <a:spcPts val="0"/>
-              </a:spcAft>
-              <a:buClrTx/>
-              <a:buSzTx/>
-              <a:buFontTx/>
-              <a:buNone/>
-              <a:tabLst/>
-              <a:defRPr/>
-            </a:pPr>
-            <a:r>
-              <a:rPr lang="en-US" dirty="0" smtClean="0"/>
-              <a:t>Seed text generated from first 40 characters of oatmeal raisin cookie recipe.</a:t>
-            </a:r>
-            <a:endParaRPr lang="en-US" dirty="0"/>
-          </a:p>
-        </p:txBody>
-      </p:sp>
       <p:sp>
         <p:nvSpPr>
           <p:cNvPr id="53" name="Content Placeholder 5"/>
@@ -8761,7 +8613,7 @@
             <p:ph sz="quarter" idx="32"/>
           </p:nvPr>
         </p:nvPicPr>
-        <p:blipFill>
+        <p:blipFill rotWithShape="1">
           <a:blip r:embed="rId12">
             <a:extLst>
               <a:ext uri="{28A0092B-C50C-407E-A947-70E740481C1C}">
@@ -8769,14 +8621,13 @@
               </a:ext>
             </a:extLst>
           </a:blip>
-          <a:stretch>
-            <a:fillRect/>
-          </a:stretch>
+          <a:srcRect t="5017" r="5914"/>
+          <a:stretch/>
         </p:blipFill>
         <p:spPr>
           <a:xfrm>
-            <a:off x="37406642" y="13107141"/>
-            <a:ext cx="6024416" cy="4141786"/>
+            <a:off x="37406642" y="13314947"/>
+            <a:ext cx="5668129" cy="3933980"/>
           </a:xfrm>
         </p:spPr>
       </p:pic>
@@ -8941,6 +8792,41 @@
                 <a:srgbClr val="FF0000"/>
               </a:solidFill>
             </a:endParaRPr>
+          </a:p>
+        </p:txBody>
+      </p:sp>
+      <p:sp>
+        <p:nvSpPr>
+          <p:cNvPr id="58" name="TextBox 57"/>
+          <p:cNvSpPr txBox="1"/>
+          <p:nvPr/>
+        </p:nvSpPr>
+        <p:spPr>
+          <a:xfrm>
+            <a:off x="31332652" y="18169648"/>
+            <a:ext cx="11742119" cy="461665"/>
+          </a:xfrm>
+          <a:prstGeom prst="rect">
+            <a:avLst/>
+          </a:prstGeom>
+          <a:solidFill>
+            <a:schemeClr val="bg1"/>
+          </a:solidFill>
+        </p:spPr>
+        <p:txBody>
+          <a:bodyPr wrap="square" rtlCol="0">
+            <a:spAutoFit/>
+          </a:bodyPr>
+          <a:lstStyle/>
+          <a:p>
+            <a:pPr marL="0" lvl="1">
+              <a:buClrTx/>
+            </a:pPr>
+            <a:r>
+              <a:rPr lang="en-US" sz="2400" dirty="0" smtClean="0"/>
+              <a:t>Insert recipe for CNN diversity 1.2 here</a:t>
+            </a:r>
+            <a:endParaRPr lang="en-US" sz="2400" dirty="0"/>
           </a:p>
         </p:txBody>
       </p:sp>

</xml_diff>

<commit_message>
made a few changes
</commit_message>
<xml_diff>
--- a/ConvectionNNPoster_V2.pptx
+++ b/ConvectionNNPoster_V2.pptx
@@ -4851,11 +4851,7 @@
             </a:pPr>
             <a:r>
               <a:rPr lang="en-US" dirty="0" smtClean="0"/>
-              <a:t>Seed text generated from first 40 characters of oatmeal </a:t>
-            </a:r>
-            <a:r>
-              <a:rPr lang="en-US" dirty="0" smtClean="0"/>
-              <a:t>cookie recipe</a:t>
+              <a:t>Seed text generated from first 40 characters of oatmeal cookie recipe</a:t>
             </a:r>
             <a:endParaRPr lang="en-US" dirty="0"/>
           </a:p>
@@ -5477,11 +5473,7 @@
             </a:r>
             <a:r>
               <a:rPr lang="en-US" dirty="0" smtClean="0"/>
-              <a:t> capable of producing reasonable </a:t>
-            </a:r>
-            <a:r>
-              <a:rPr lang="en-US" dirty="0" smtClean="0"/>
-              <a:t>recipes</a:t>
+              <a:t> capable of producing reasonable recipes</a:t>
             </a:r>
           </a:p>
           <a:p>
@@ -5545,7 +5537,6 @@
               <a:rPr lang="en-US" dirty="0" smtClean="0"/>
               <a:t>Use prepended titles as part of training observations to give models the ability to generate recipes using created titles</a:t>
             </a:r>
-            <a:endParaRPr lang="en-US" dirty="0" smtClean="0"/>
           </a:p>
           <a:p>
             <a:pPr lvl="1">
@@ -5555,7 +5546,6 @@
               <a:rPr lang="en-US" dirty="0" smtClean="0"/>
               <a:t>Generalize to include other recipe types, then generate hybrid recipes</a:t>
             </a:r>
-            <a:endParaRPr lang="en-US" dirty="0" smtClean="0"/>
           </a:p>
         </p:txBody>
       </p:sp>
@@ -5740,11 +5730,7 @@
             </a:r>
             <a:r>
               <a:rPr lang="en-US" sz="2000" smtClean="0"/>
-              <a:t>Geoffrey </a:t>
-            </a:r>
-            <a:r>
-              <a:rPr lang="en-US" sz="2000" smtClean="0"/>
-              <a:t>Hinton)</a:t>
+              <a:t>Geoffrey Hinton)</a:t>
             </a:r>
             <a:endParaRPr lang="en-US" sz="2000" dirty="0"/>
           </a:p>
@@ -5789,14 +5775,14 @@
           </a:ln>
           <a:extLst>
             <a:ext uri="{909E8E84-426E-40dd-AFC4-6F175D3DCCD1}">
-              <a14:hiddenFill xmlns="" xmlns:a14="http://schemas.microsoft.com/office/drawing/2010/main">
+              <a14:hiddenFill xmlns:a14="http://schemas.microsoft.com/office/drawing/2010/main" xmlns="">
                 <a:solidFill>
                   <a:srgbClr val="FFFFFF"/>
                 </a:solidFill>
               </a14:hiddenFill>
             </a:ext>
             <a:ext uri="{91240B29-F687-4f45-9708-019B960494DF}">
-              <a14:hiddenLine xmlns="" xmlns:a14="http://schemas.microsoft.com/office/drawing/2010/main" w="9525">
+              <a14:hiddenLine xmlns:a14="http://schemas.microsoft.com/office/drawing/2010/main" xmlns="" w="9525">
                 <a:solidFill>
                   <a:srgbClr val="000000"/>
                 </a:solidFill>
@@ -6875,8 +6861,12 @@
               <a:t>Yummly</a:t>
             </a:r>
             <a:r>
-              <a:rPr lang="en-US" dirty="0" smtClean="0"/>
-              <a:t> on the </a:t>
+              <a:rPr lang="en-US" smtClean="0"/>
+              <a:t> </a:t>
+            </a:r>
+            <a:r>
+              <a:rPr lang="en-US" smtClean="0"/>
+              <a:t>using the </a:t>
             </a:r>
             <a:r>
               <a:rPr lang="en-US" dirty="0"/>
@@ -8797,36 +8787,79 @@
       </p:sp>
       <p:sp>
         <p:nvSpPr>
-          <p:cNvPr id="58" name="TextBox 57"/>
-          <p:cNvSpPr txBox="1"/>
-          <p:nvPr/>
+          <p:cNvPr id="55" name="Content Placeholder 5"/>
+          <p:cNvSpPr>
+            <a:spLocks noGrp="1"/>
+          </p:cNvSpPr>
+          <p:nvPr>
+            <p:ph sz="quarter" idx="33"/>
+          </p:nvPr>
         </p:nvSpPr>
         <p:spPr>
           <a:xfrm>
-            <a:off x="31332652" y="18169648"/>
-            <a:ext cx="11742119" cy="461665"/>
+            <a:off x="31311887" y="18236780"/>
+            <a:ext cx="11556425" cy="1965506"/>
           </a:xfrm>
-          <a:prstGeom prst="rect">
-            <a:avLst/>
-          </a:prstGeom>
           <a:solidFill>
             <a:schemeClr val="bg1"/>
           </a:solidFill>
         </p:spPr>
         <p:txBody>
-          <a:bodyPr wrap="square" rtlCol="0">
-            <a:spAutoFit/>
+          <a:bodyPr>
+            <a:normAutofit lnSpcReduction="10000"/>
           </a:bodyPr>
           <a:lstStyle/>
           <a:p>
-            <a:pPr marL="0" lvl="1">
+            <a:pPr marL="0" indent="0" defTabSz="914400">
+              <a:spcBef>
+                <a:spcPts val="0"/>
+              </a:spcBef>
               <a:buClrTx/>
-            </a:pPr>
-            <a:r>
-              <a:rPr lang="en-US" sz="2400" dirty="0" smtClean="0"/>
-              <a:t>Insert recipe for CNN diversity 1.2 here</a:t>
-            </a:r>
-            <a:endParaRPr lang="en-US" sz="2400" dirty="0"/>
+              <a:buNone/>
+              <a:defRPr/>
+            </a:pPr>
+            <a:r>
+              <a:rPr lang="en-US" sz="2400" b="1" dirty="0"/>
+              <a:t>Example </a:t>
+            </a:r>
+            <a:r>
+              <a:rPr lang="en-US" sz="2400" b="1" dirty="0" smtClean="0"/>
+              <a:t>Output:</a:t>
+            </a:r>
+            <a:r>
+              <a:rPr lang="en-US" sz="2000" dirty="0" smtClean="0"/>
+              <a:t/>
+            </a:r>
+            <a:br>
+              <a:rPr lang="en-US" sz="2000" dirty="0" smtClean="0"/>
+            </a:br>
+            <a:r>
+              <a:rPr lang="en-US" sz="1900" dirty="0" smtClean="0"/>
+              <a:t>1/2 </a:t>
+            </a:r>
+            <a:r>
+              <a:rPr lang="en-US" sz="1900" dirty="0"/>
+              <a:t>tsp. baking soda,1 tsp. vanilla extract,1 cup all purpose flour,1 teaspoon baking soda,1 teaspoon salt,6 tablespoons brown sugar,2 cups candy covered plus  1/4 finely diced,1/2 cup firmly packed brown sugar,1 egg  1 3/4 cups sugar,2 la 1/2 tsp. baking soda,1 tsp. vanilla extract  2 cups chocolate chips,1/2 cup agave nectar,1 teaspoon coconut extract ,1 teaspoon salt,1 cup </a:t>
+            </a:r>
+            <a:r>
+              <a:rPr lang="en-US" sz="1900" dirty="0" err="1"/>
+              <a:t>nutella</a:t>
+            </a:r>
+            <a:r>
+              <a:rPr lang="en-US" sz="1900" dirty="0"/>
+              <a:t>, 1/2 cup rainbow sprinkles of chopped nuts,1/3 cup chocolate hot cocoa powder,1 tsp vanilla </a:t>
+            </a:r>
+          </a:p>
+          <a:p>
+            <a:pPr marL="0" lvl="0" indent="0" defTabSz="914400">
+              <a:spcBef>
+                <a:spcPts val="0"/>
+              </a:spcBef>
+              <a:buClrTx/>
+              <a:buNone/>
+              <a:defRPr/>
+            </a:pPr>
+            <a:endParaRPr lang="en-US" sz="1900" dirty="0"/>
           </a:p>
         </p:txBody>
       </p:sp>

</xml_diff>